<commit_message>
adding a swagger in the presentation
</commit_message>
<xml_diff>
--- a/TechnoMarket-FinalProject.pptx
+++ b/TechnoMarket-FinalProject.pptx
@@ -7,18 +7,20 @@
     <p:sldMasterId id="2147483673" r:id="rId3"/>
   </p:sldMasterIdLst>
   <p:notesMasterIdLst>
-    <p:notesMasterId r:id="rId13"/>
+    <p:notesMasterId r:id="rId15"/>
   </p:notesMasterIdLst>
   <p:sldIdLst>
     <p:sldId id="344" r:id="rId4"/>
     <p:sldId id="314" r:id="rId5"/>
     <p:sldId id="348" r:id="rId6"/>
-    <p:sldId id="326" r:id="rId7"/>
-    <p:sldId id="317" r:id="rId8"/>
-    <p:sldId id="340" r:id="rId9"/>
-    <p:sldId id="349" r:id="rId10"/>
-    <p:sldId id="329" r:id="rId11"/>
-    <p:sldId id="346" r:id="rId12"/>
+    <p:sldId id="350" r:id="rId7"/>
+    <p:sldId id="351" r:id="rId8"/>
+    <p:sldId id="326" r:id="rId9"/>
+    <p:sldId id="317" r:id="rId10"/>
+    <p:sldId id="340" r:id="rId11"/>
+    <p:sldId id="349" r:id="rId12"/>
+    <p:sldId id="329" r:id="rId13"/>
+    <p:sldId id="346" r:id="rId14"/>
   </p:sldIdLst>
   <p:sldSz cx="12192000" cy="6858000"/>
   <p:notesSz cx="6858000" cy="9144000"/>
@@ -218,7 +220,7 @@
           <a:p>
             <a:fld id="{4AAAF045-FEF6-43EA-9CDC-C84FC3F85E9C}" type="datetimeFigureOut">
               <a:rPr lang="en-US" smtClean="0"/>
-              <a:t>4/6/2021</a:t>
+              <a:t>4/11/2021</a:t>
             </a:fld>
             <a:endParaRPr lang="en-US"/>
           </a:p>
@@ -6075,6 +6077,199 @@
   <p:clrMapOvr>
     <a:masterClrMapping/>
   </p:clrMapOvr>
+  <p:timing>
+    <p:tnLst>
+      <p:par>
+        <p:cTn id="1" dur="indefinite" restart="never" nodeType="tmRoot"/>
+      </p:par>
+    </p:tnLst>
+  </p:timing>
+</p:sld>
+</file>
+
+<file path=ppt/slides/slide10.xml><?xml version="1.0" encoding="utf-8"?>
+<p:sld xmlns:a="http://schemas.openxmlformats.org/drawingml/2006/main" xmlns:r="http://schemas.openxmlformats.org/officeDocument/2006/relationships" xmlns:p="http://schemas.openxmlformats.org/presentationml/2006/main">
+  <p:cSld>
+    <p:spTree>
+      <p:nvGrpSpPr>
+        <p:cNvPr id="1" name=""/>
+        <p:cNvGrpSpPr/>
+        <p:nvPr/>
+      </p:nvGrpSpPr>
+      <p:grpSpPr>
+        <a:xfrm>
+          <a:off x="0" y="0"/>
+          <a:ext cx="0" cy="0"/>
+          <a:chOff x="0" y="0"/>
+          <a:chExt cx="0" cy="0"/>
+        </a:xfrm>
+      </p:grpSpPr>
+      <p:sp>
+        <p:nvSpPr>
+          <p:cNvPr id="6" name="직사각형 5">
+            <a:extLst>
+              <a:ext uri="{FF2B5EF4-FFF2-40B4-BE49-F238E27FC236}">
+                <a16:creationId xmlns:a16="http://schemas.microsoft.com/office/drawing/2014/main" id="{5687AD07-703B-47CA-97EF-EB0084BCA8BC}"/>
+              </a:ext>
+            </a:extLst>
+          </p:cNvPr>
+          <p:cNvSpPr/>
+          <p:nvPr/>
+        </p:nvSpPr>
+        <p:spPr>
+          <a:xfrm>
+            <a:off x="5471178" y="3049802"/>
+            <a:ext cx="1606956" cy="720638"/>
+          </a:xfrm>
+          <a:prstGeom prst="rect">
+            <a:avLst/>
+          </a:prstGeom>
+          <a:noFill/>
+        </p:spPr>
+        <p:txBody>
+          <a:bodyPr lIns="0" anchor="ctr"/>
+          <a:lstStyle/>
+          <a:p>
+            <a:r>
+              <a:rPr lang="bg-BG" altLang="ko-KR" sz="4000" b="1" dirty="0">
+                <a:solidFill>
+                  <a:schemeClr val="bg1"/>
+                </a:solidFill>
+                <a:latin typeface="+mj-lt"/>
+              </a:rPr>
+              <a:t>Демо</a:t>
+            </a:r>
+            <a:endParaRPr lang="en-US" altLang="ko-KR" sz="4000" b="1" dirty="0">
+              <a:solidFill>
+                <a:schemeClr val="bg1"/>
+              </a:solidFill>
+              <a:latin typeface="+mj-lt"/>
+            </a:endParaRPr>
+          </a:p>
+        </p:txBody>
+      </p:sp>
+    </p:spTree>
+    <p:extLst>
+      <p:ext uri="{BB962C8B-B14F-4D97-AF65-F5344CB8AC3E}">
+        <p14:creationId xmlns:p14="http://schemas.microsoft.com/office/powerpoint/2010/main" val="1585171815"/>
+      </p:ext>
+    </p:extLst>
+  </p:cSld>
+  <p:clrMapOvr>
+    <a:masterClrMapping/>
+  </p:clrMapOvr>
+</p:sld>
+</file>
+
+<file path=ppt/slides/slide11.xml><?xml version="1.0" encoding="utf-8"?>
+<p:sld xmlns:a="http://schemas.openxmlformats.org/drawingml/2006/main" xmlns:r="http://schemas.openxmlformats.org/officeDocument/2006/relationships" xmlns:p="http://schemas.openxmlformats.org/presentationml/2006/main">
+  <p:cSld>
+    <p:spTree>
+      <p:nvGrpSpPr>
+        <p:cNvPr id="1" name=""/>
+        <p:cNvGrpSpPr/>
+        <p:nvPr/>
+      </p:nvGrpSpPr>
+      <p:grpSpPr>
+        <a:xfrm>
+          <a:off x="0" y="0"/>
+          <a:ext cx="0" cy="0"/>
+          <a:chOff x="0" y="0"/>
+          <a:chExt cx="0" cy="0"/>
+        </a:xfrm>
+      </p:grpSpPr>
+      <p:sp>
+        <p:nvSpPr>
+          <p:cNvPr id="4" name="TextBox 3">
+            <a:extLst>
+              <a:ext uri="{FF2B5EF4-FFF2-40B4-BE49-F238E27FC236}">
+                <a16:creationId xmlns:a16="http://schemas.microsoft.com/office/drawing/2014/main" id="{1DF8EF26-7AD5-4E7F-95B3-9A57CF80C483}"/>
+              </a:ext>
+            </a:extLst>
+          </p:cNvPr>
+          <p:cNvSpPr txBox="1"/>
+          <p:nvPr/>
+        </p:nvSpPr>
+        <p:spPr>
+          <a:xfrm>
+            <a:off x="1" y="4714489"/>
+            <a:ext cx="12191999" cy="1015663"/>
+          </a:xfrm>
+          <a:prstGeom prst="rect">
+            <a:avLst/>
+          </a:prstGeom>
+          <a:noFill/>
+        </p:spPr>
+        <p:txBody>
+          <a:bodyPr wrap="square" rtlCol="0" anchor="ctr">
+            <a:spAutoFit/>
+          </a:bodyPr>
+          <a:lstStyle/>
+          <a:p>
+            <a:pPr algn="ctr"/>
+            <a:r>
+              <a:rPr lang="bg-BG" altLang="ko-KR" sz="6000" dirty="0">
+                <a:cs typeface="Arial" pitchFamily="34" charset="0"/>
+              </a:rPr>
+              <a:t>Благодарим за вниманието!</a:t>
+            </a:r>
+            <a:endParaRPr lang="ko-KR" altLang="en-US" sz="6000" dirty="0">
+              <a:cs typeface="Arial" pitchFamily="34" charset="0"/>
+            </a:endParaRPr>
+          </a:p>
+        </p:txBody>
+      </p:sp>
+      <p:sp>
+        <p:nvSpPr>
+          <p:cNvPr id="5" name="TextBox 4">
+            <a:extLst>
+              <a:ext uri="{FF2B5EF4-FFF2-40B4-BE49-F238E27FC236}">
+                <a16:creationId xmlns:a16="http://schemas.microsoft.com/office/drawing/2014/main" id="{BADEB2CA-D11F-4CA5-BC5A-6C38FF4BF392}"/>
+              </a:ext>
+            </a:extLst>
+          </p:cNvPr>
+          <p:cNvSpPr txBox="1"/>
+          <p:nvPr/>
+        </p:nvSpPr>
+        <p:spPr>
+          <a:xfrm>
+            <a:off x="51" y="5653820"/>
+            <a:ext cx="12191852" cy="379656"/>
+          </a:xfrm>
+          <a:prstGeom prst="rect">
+            <a:avLst/>
+          </a:prstGeom>
+          <a:noFill/>
+        </p:spPr>
+        <p:txBody>
+          <a:bodyPr wrap="square" rtlCol="0" anchor="ctr">
+            <a:spAutoFit/>
+          </a:bodyPr>
+          <a:lstStyle/>
+          <a:p>
+            <a:pPr algn="ctr"/>
+            <a:r>
+              <a:rPr lang="bg-BG" altLang="ko-KR" sz="1867" dirty="0">
+                <a:cs typeface="Arial" pitchFamily="34" charset="0"/>
+              </a:rPr>
+              <a:t>Емил Коев и Павел Коев</a:t>
+            </a:r>
+            <a:endParaRPr lang="ko-KR" altLang="en-US" sz="1867" dirty="0">
+              <a:cs typeface="Arial" pitchFamily="34" charset="0"/>
+            </a:endParaRPr>
+          </a:p>
+        </p:txBody>
+      </p:sp>
+    </p:spTree>
+    <p:extLst>
+      <p:ext uri="{BB962C8B-B14F-4D97-AF65-F5344CB8AC3E}">
+        <p14:creationId xmlns:p14="http://schemas.microsoft.com/office/powerpoint/2010/main" val="821656516"/>
+      </p:ext>
+    </p:extLst>
+  </p:cSld>
+  <p:clrMapOvr>
+    <a:masterClrMapping/>
+  </p:clrMapOvr>
 </p:sld>
 </file>
 
@@ -6219,6 +6414,13 @@
   <p:clrMapOvr>
     <a:masterClrMapping/>
   </p:clrMapOvr>
+  <p:timing>
+    <p:tnLst>
+      <p:par>
+        <p:cTn id="1" dur="indefinite" restart="never" nodeType="tmRoot"/>
+      </p:par>
+    </p:tnLst>
+  </p:timing>
 </p:sld>
 </file>
 
@@ -6307,94 +6509,54 @@
           </a:p>
         </p:txBody>
       </p:sp>
-      <p:sp>
-        <p:nvSpPr>
-          <p:cNvPr id="5" name="Текстово поле 4">
-            <a:extLst>
-              <a:ext uri="{FF2B5EF4-FFF2-40B4-BE49-F238E27FC236}">
-                <a16:creationId xmlns:a16="http://schemas.microsoft.com/office/drawing/2014/main" id="{F17BC8BF-165E-41FC-8A93-EAA075853E0A}"/>
-              </a:ext>
-            </a:extLst>
-          </p:cNvPr>
-          <p:cNvSpPr txBox="1"/>
+      <p:pic>
+        <p:nvPicPr>
+          <p:cNvPr id="4" name="Картина 3"/>
+          <p:cNvPicPr>
+            <a:picLocks noChangeAspect="1"/>
+          </p:cNvPicPr>
           <p:nvPr/>
-        </p:nvSpPr>
+        </p:nvPicPr>
+        <p:blipFill>
+          <a:blip r:embed="rId3"/>
+          <a:stretch>
+            <a:fillRect/>
+          </a:stretch>
+        </p:blipFill>
         <p:spPr>
           <a:xfrm>
-            <a:off x="6644936" y="2685209"/>
-            <a:ext cx="3826276" cy="923330"/>
+            <a:off x="646476" y="250167"/>
+            <a:ext cx="4038734" cy="6174243"/>
           </a:xfrm>
           <a:prstGeom prst="rect">
             <a:avLst/>
           </a:prstGeom>
-          <a:noFill/>
         </p:spPr>
-        <p:txBody>
-          <a:bodyPr wrap="square" rtlCol="0">
-            <a:spAutoFit/>
-          </a:bodyPr>
-          <a:lstStyle/>
-          <a:p>
-            <a:r>
-              <a:rPr lang="en-US" dirty="0"/>
-              <a:t>User:</a:t>
-            </a:r>
-          </a:p>
-          <a:p>
-            <a:r>
-              <a:rPr lang="en-US" dirty="0"/>
-              <a:t>Register, Login, Logout, Edit, Delete, Order</a:t>
-            </a:r>
-          </a:p>
-        </p:txBody>
-      </p:sp>
-      <p:sp>
-        <p:nvSpPr>
-          <p:cNvPr id="6" name="Текстово поле 5">
-            <a:extLst>
-              <a:ext uri="{FF2B5EF4-FFF2-40B4-BE49-F238E27FC236}">
-                <a16:creationId xmlns:a16="http://schemas.microsoft.com/office/drawing/2014/main" id="{FC12DE94-C5BF-40E5-AF91-94AF07D5403F}"/>
-              </a:ext>
-            </a:extLst>
-          </p:cNvPr>
-          <p:cNvSpPr txBox="1"/>
+      </p:pic>
+      <p:pic>
+        <p:nvPicPr>
+          <p:cNvPr id="7" name="Картина 6"/>
+          <p:cNvPicPr>
+            <a:picLocks noChangeAspect="1"/>
+          </p:cNvPicPr>
           <p:nvPr/>
-        </p:nvSpPr>
+        </p:nvPicPr>
+        <p:blipFill>
+          <a:blip r:embed="rId4"/>
+          <a:stretch>
+            <a:fillRect/>
+          </a:stretch>
+        </p:blipFill>
         <p:spPr>
           <a:xfrm>
-            <a:off x="6644936" y="3911165"/>
-            <a:ext cx="3764131" cy="1200329"/>
+            <a:off x="6047967" y="2000755"/>
+            <a:ext cx="4402319" cy="4423655"/>
           </a:xfrm>
           <a:prstGeom prst="rect">
             <a:avLst/>
           </a:prstGeom>
-          <a:noFill/>
         </p:spPr>
-        <p:txBody>
-          <a:bodyPr wrap="square" rtlCol="0">
-            <a:spAutoFit/>
-          </a:bodyPr>
-          <a:lstStyle/>
-          <a:p>
-            <a:r>
-              <a:rPr lang="en-US" dirty="0"/>
-              <a:t>Products:</a:t>
-            </a:r>
-          </a:p>
-          <a:p>
-            <a:r>
-              <a:rPr lang="en-US" dirty="0"/>
-              <a:t>Admin: Create, Edit, Delete</a:t>
-            </a:r>
-          </a:p>
-          <a:p>
-            <a:r>
-              <a:rPr lang="en-US" dirty="0"/>
-              <a:t>User: Get by filters, like, dislike, comment</a:t>
-            </a:r>
-          </a:p>
-        </p:txBody>
-      </p:sp>
+      </p:pic>
     </p:spTree>
     <p:extLst>
       <p:ext uri="{BB962C8B-B14F-4D97-AF65-F5344CB8AC3E}">
@@ -6405,10 +6567,235 @@
   <p:clrMapOvr>
     <a:masterClrMapping/>
   </p:clrMapOvr>
+  <p:timing>
+    <p:tnLst>
+      <p:par>
+        <p:cTn id="1" dur="indefinite" restart="never" nodeType="tmRoot"/>
+      </p:par>
+    </p:tnLst>
+  </p:timing>
 </p:sld>
 </file>
 
 <file path=ppt/slides/slide4.xml><?xml version="1.0" encoding="utf-8"?>
+<p:sld xmlns:a="http://schemas.openxmlformats.org/drawingml/2006/main" xmlns:r="http://schemas.openxmlformats.org/officeDocument/2006/relationships" xmlns:p="http://schemas.openxmlformats.org/presentationml/2006/main">
+  <p:cSld>
+    <p:spTree>
+      <p:nvGrpSpPr>
+        <p:cNvPr id="1" name=""/>
+        <p:cNvGrpSpPr/>
+        <p:nvPr/>
+      </p:nvGrpSpPr>
+      <p:grpSpPr>
+        <a:xfrm>
+          <a:off x="0" y="0"/>
+          <a:ext cx="0" cy="0"/>
+          <a:chOff x="0" y="0"/>
+          <a:chExt cx="0" cy="0"/>
+        </a:xfrm>
+      </p:grpSpPr>
+      <p:pic>
+        <p:nvPicPr>
+          <p:cNvPr id="4" name="Картина 3"/>
+          <p:cNvPicPr>
+            <a:picLocks noChangeAspect="1"/>
+          </p:cNvPicPr>
+          <p:nvPr/>
+        </p:nvPicPr>
+        <p:blipFill>
+          <a:blip r:embed="rId2"/>
+          <a:stretch>
+            <a:fillRect/>
+          </a:stretch>
+        </p:blipFill>
+        <p:spPr>
+          <a:xfrm>
+            <a:off x="156228" y="155453"/>
+            <a:ext cx="4637598" cy="4007244"/>
+          </a:xfrm>
+          <a:prstGeom prst="rect">
+            <a:avLst/>
+          </a:prstGeom>
+        </p:spPr>
+      </p:pic>
+      <p:pic>
+        <p:nvPicPr>
+          <p:cNvPr id="5" name="Картина 4"/>
+          <p:cNvPicPr>
+            <a:picLocks noChangeAspect="1"/>
+          </p:cNvPicPr>
+          <p:nvPr/>
+        </p:nvPicPr>
+        <p:blipFill>
+          <a:blip r:embed="rId3"/>
+          <a:stretch>
+            <a:fillRect/>
+          </a:stretch>
+        </p:blipFill>
+        <p:spPr>
+          <a:xfrm>
+            <a:off x="6209424" y="155453"/>
+            <a:ext cx="5136715" cy="3345043"/>
+          </a:xfrm>
+          <a:prstGeom prst="rect">
+            <a:avLst/>
+          </a:prstGeom>
+        </p:spPr>
+      </p:pic>
+      <p:pic>
+        <p:nvPicPr>
+          <p:cNvPr id="7" name="Картина 6"/>
+          <p:cNvPicPr>
+            <a:picLocks noChangeAspect="1"/>
+          </p:cNvPicPr>
+          <p:nvPr/>
+        </p:nvPicPr>
+        <p:blipFill>
+          <a:blip r:embed="rId4"/>
+          <a:stretch>
+            <a:fillRect/>
+          </a:stretch>
+        </p:blipFill>
+        <p:spPr>
+          <a:xfrm>
+            <a:off x="5028957" y="3622766"/>
+            <a:ext cx="4532596" cy="3100252"/>
+          </a:xfrm>
+          <a:prstGeom prst="rect">
+            <a:avLst/>
+          </a:prstGeom>
+        </p:spPr>
+      </p:pic>
+    </p:spTree>
+    <p:extLst>
+      <p:ext uri="{BB962C8B-B14F-4D97-AF65-F5344CB8AC3E}">
+        <p14:creationId xmlns:p14="http://schemas.microsoft.com/office/powerpoint/2010/main" val="2348800768"/>
+      </p:ext>
+    </p:extLst>
+  </p:cSld>
+  <p:clrMapOvr>
+    <a:masterClrMapping/>
+  </p:clrMapOvr>
+  <p:timing>
+    <p:tnLst>
+      <p:par>
+        <p:cTn id="1" dur="indefinite" restart="never" nodeType="tmRoot"/>
+      </p:par>
+    </p:tnLst>
+  </p:timing>
+</p:sld>
+</file>
+
+<file path=ppt/slides/slide5.xml><?xml version="1.0" encoding="utf-8"?>
+<p:sld xmlns:a="http://schemas.openxmlformats.org/drawingml/2006/main" xmlns:r="http://schemas.openxmlformats.org/officeDocument/2006/relationships" xmlns:p="http://schemas.openxmlformats.org/presentationml/2006/main">
+  <p:cSld>
+    <p:spTree>
+      <p:nvGrpSpPr>
+        <p:cNvPr id="1" name=""/>
+        <p:cNvGrpSpPr/>
+        <p:nvPr/>
+      </p:nvGrpSpPr>
+      <p:grpSpPr>
+        <a:xfrm>
+          <a:off x="0" y="0"/>
+          <a:ext cx="0" cy="0"/>
+          <a:chOff x="0" y="0"/>
+          <a:chExt cx="0" cy="0"/>
+        </a:xfrm>
+      </p:grpSpPr>
+      <p:pic>
+        <p:nvPicPr>
+          <p:cNvPr id="3" name="Картина 2"/>
+          <p:cNvPicPr>
+            <a:picLocks noChangeAspect="1"/>
+          </p:cNvPicPr>
+          <p:nvPr/>
+        </p:nvPicPr>
+        <p:blipFill>
+          <a:blip r:embed="rId2"/>
+          <a:stretch>
+            <a:fillRect/>
+          </a:stretch>
+        </p:blipFill>
+        <p:spPr>
+          <a:xfrm>
+            <a:off x="2429282" y="63844"/>
+            <a:ext cx="4903335" cy="3526537"/>
+          </a:xfrm>
+          <a:prstGeom prst="rect">
+            <a:avLst/>
+          </a:prstGeom>
+        </p:spPr>
+      </p:pic>
+      <p:pic>
+        <p:nvPicPr>
+          <p:cNvPr id="4" name="Картина 3"/>
+          <p:cNvPicPr>
+            <a:picLocks noChangeAspect="1"/>
+          </p:cNvPicPr>
+          <p:nvPr/>
+        </p:nvPicPr>
+        <p:blipFill>
+          <a:blip r:embed="rId3"/>
+          <a:stretch>
+            <a:fillRect/>
+          </a:stretch>
+        </p:blipFill>
+        <p:spPr>
+          <a:xfrm>
+            <a:off x="6505303" y="3664052"/>
+            <a:ext cx="5308924" cy="3107864"/>
+          </a:xfrm>
+          <a:prstGeom prst="rect">
+            <a:avLst/>
+          </a:prstGeom>
+        </p:spPr>
+      </p:pic>
+      <p:pic>
+        <p:nvPicPr>
+          <p:cNvPr id="5" name="Картина 4"/>
+          <p:cNvPicPr>
+            <a:picLocks noChangeAspect="1"/>
+          </p:cNvPicPr>
+          <p:nvPr/>
+        </p:nvPicPr>
+        <p:blipFill>
+          <a:blip r:embed="rId4"/>
+          <a:stretch>
+            <a:fillRect/>
+          </a:stretch>
+        </p:blipFill>
+        <p:spPr>
+          <a:xfrm>
+            <a:off x="552652" y="3664052"/>
+            <a:ext cx="5338310" cy="3107864"/>
+          </a:xfrm>
+          <a:prstGeom prst="rect">
+            <a:avLst/>
+          </a:prstGeom>
+        </p:spPr>
+      </p:pic>
+    </p:spTree>
+    <p:extLst>
+      <p:ext uri="{BB962C8B-B14F-4D97-AF65-F5344CB8AC3E}">
+        <p14:creationId xmlns:p14="http://schemas.microsoft.com/office/powerpoint/2010/main" val="1409710966"/>
+      </p:ext>
+    </p:extLst>
+  </p:cSld>
+  <p:clrMapOvr>
+    <a:masterClrMapping/>
+  </p:clrMapOvr>
+  <p:timing>
+    <p:tnLst>
+      <p:par>
+        <p:cTn id="1" dur="indefinite" restart="never" nodeType="tmRoot"/>
+      </p:par>
+    </p:tnLst>
+  </p:timing>
+</p:sld>
+</file>
+
+<file path=ppt/slides/slide6.xml><?xml version="1.0" encoding="utf-8"?>
 <p:sld xmlns:a="http://schemas.openxmlformats.org/drawingml/2006/main" xmlns:r="http://schemas.openxmlformats.org/officeDocument/2006/relationships" xmlns:p="http://schemas.openxmlformats.org/presentationml/2006/main">
   <p:cSld>
     <p:spTree>
@@ -6446,7 +6833,7 @@
             <p:nvPr/>
           </p:nvPicPr>
           <p:blipFill>
-            <a:blip r:embed="rId2"/>
+            <a:blip r:embed="rId3"/>
             <a:stretch>
               <a:fillRect/>
             </a:stretch>
@@ -6468,7 +6855,7 @@
             <p:nvPr/>
           </p:nvPicPr>
           <p:blipFill>
-            <a:blip r:embed="rId3"/>
+            <a:blip r:embed="rId4"/>
             <a:stretch>
               <a:fillRect/>
             </a:stretch>
@@ -6490,7 +6877,7 @@
             <p:nvPr/>
           </p:nvPicPr>
           <p:blipFill>
-            <a:blip r:embed="rId4"/>
+            <a:blip r:embed="rId5"/>
             <a:stretch>
               <a:fillRect/>
             </a:stretch>
@@ -6512,7 +6899,7 @@
             <p:nvPr/>
           </p:nvPicPr>
           <p:blipFill>
-            <a:blip r:embed="rId5"/>
+            <a:blip r:embed="rId6"/>
             <a:stretch>
               <a:fillRect/>
             </a:stretch>
@@ -6534,7 +6921,7 @@
             <p:nvPr/>
           </p:nvPicPr>
           <p:blipFill>
-            <a:blip r:embed="rId6"/>
+            <a:blip r:embed="rId7"/>
             <a:stretch>
               <a:fillRect/>
             </a:stretch>
@@ -6556,7 +6943,7 @@
             <p:nvPr/>
           </p:nvPicPr>
           <p:blipFill>
-            <a:blip r:embed="rId7"/>
+            <a:blip r:embed="rId8"/>
             <a:stretch>
               <a:fillRect/>
             </a:stretch>
@@ -6578,7 +6965,7 @@
             <p:nvPr/>
           </p:nvPicPr>
           <p:blipFill>
-            <a:blip r:embed="rId8"/>
+            <a:blip r:embed="rId9"/>
             <a:stretch>
               <a:fillRect/>
             </a:stretch>
@@ -6600,7 +6987,7 @@
             <p:nvPr/>
           </p:nvPicPr>
           <p:blipFill>
-            <a:blip r:embed="rId9"/>
+            <a:blip r:embed="rId10"/>
             <a:stretch>
               <a:fillRect/>
             </a:stretch>
@@ -6622,7 +7009,7 @@
             <p:nvPr/>
           </p:nvPicPr>
           <p:blipFill>
-            <a:blip r:embed="rId10"/>
+            <a:blip r:embed="rId11"/>
             <a:stretch>
               <a:fillRect/>
             </a:stretch>
@@ -6645,7 +7032,7 @@
           <p:nvPr/>
         </p:nvPicPr>
         <p:blipFill>
-          <a:blip r:embed="rId11"/>
+          <a:blip r:embed="rId12"/>
           <a:stretch>
             <a:fillRect/>
           </a:stretch>
@@ -6848,12 +7235,12 @@
           <a:graphicData uri="http://schemas.openxmlformats.org/presentationml/2006/ole">
             <mc:AlternateContent xmlns:mc="http://schemas.openxmlformats.org/markup-compatibility/2006">
               <mc:Choice xmlns:v="urn:schemas-microsoft-com:vml" Requires="v">
-                <p:oleObj r:id="rId12" imgW="3415680" imgH="3212640" progId="">
+                <p:oleObj spid="_x0000_s1027" r:id="rId13" imgW="3415680" imgH="3212640" progId="">
                   <p:embed/>
                 </p:oleObj>
               </mc:Choice>
               <mc:Fallback>
-                <p:oleObj r:id="rId12" imgW="3415680" imgH="3212640" progId="">
+                <p:oleObj r:id="rId13" imgW="3415680" imgH="3212640" progId="">
                   <p:embed/>
                   <p:pic>
                     <p:nvPicPr>
@@ -6862,7 +7249,7 @@
                       <p:nvPr/>
                     </p:nvPicPr>
                     <p:blipFill>
-                      <a:blip r:embed="rId13"/>
+                      <a:blip r:embed="rId14"/>
                       <a:stretch>
                         <a:fillRect/>
                       </a:stretch>
@@ -6898,7 +7285,7 @@
           <p:nvPr/>
         </p:nvPicPr>
         <p:blipFill>
-          <a:blip r:embed="rId14">
+          <a:blip r:embed="rId15">
             <a:extLst>
               <a:ext uri="{28A0092B-C50C-407E-A947-70E740481C1C}">
                 <a14:useLocalDpi xmlns:a14="http://schemas.microsoft.com/office/drawing/2010/main" val="0"/>
@@ -6929,10 +7316,17 @@
   <p:clrMapOvr>
     <a:masterClrMapping/>
   </p:clrMapOvr>
+  <p:timing>
+    <p:tnLst>
+      <p:par>
+        <p:cTn id="1" dur="indefinite" restart="never" nodeType="tmRoot"/>
+      </p:par>
+    </p:tnLst>
+  </p:timing>
 </p:sld>
 </file>
 
-<file path=ppt/slides/slide5.xml><?xml version="1.0" encoding="utf-8"?>
+<file path=ppt/slides/slide7.xml><?xml version="1.0" encoding="utf-8"?>
 <p:sld xmlns:a="http://schemas.openxmlformats.org/drawingml/2006/main" xmlns:r="http://schemas.openxmlformats.org/officeDocument/2006/relationships" xmlns:p="http://schemas.openxmlformats.org/presentationml/2006/main">
   <p:cSld>
     <p:spTree>
@@ -6989,10 +7383,17 @@
   <p:clrMapOvr>
     <a:masterClrMapping/>
   </p:clrMapOvr>
+  <p:timing>
+    <p:tnLst>
+      <p:par>
+        <p:cTn id="1" dur="indefinite" restart="never" nodeType="tmRoot"/>
+      </p:par>
+    </p:tnLst>
+  </p:timing>
 </p:sld>
 </file>
 
-<file path=ppt/slides/slide6.xml><?xml version="1.0" encoding="utf-8"?>
+<file path=ppt/slides/slide8.xml><?xml version="1.0" encoding="utf-8"?>
 <p:sld xmlns:a="http://schemas.openxmlformats.org/drawingml/2006/main" xmlns:r="http://schemas.openxmlformats.org/officeDocument/2006/relationships" xmlns:p="http://schemas.openxmlformats.org/presentationml/2006/main">
   <p:cSld>
     <p:spTree>
@@ -9163,7 +9564,7 @@
 </p:sld>
 </file>
 
-<file path=ppt/slides/slide7.xml><?xml version="1.0" encoding="utf-8"?>
+<file path=ppt/slides/slide9.xml><?xml version="1.0" encoding="utf-8"?>
 <p:sld xmlns:a="http://schemas.openxmlformats.org/drawingml/2006/main" xmlns:r="http://schemas.openxmlformats.org/officeDocument/2006/relationships" xmlns:p="http://schemas.openxmlformats.org/presentationml/2006/main">
   <p:cSld>
     <p:spTree>
@@ -11345,192 +11746,6 @@
     <p:extLst>
       <p:ext uri="{BB962C8B-B14F-4D97-AF65-F5344CB8AC3E}">
         <p14:creationId xmlns:p14="http://schemas.microsoft.com/office/powerpoint/2010/main" val="176193810"/>
-      </p:ext>
-    </p:extLst>
-  </p:cSld>
-  <p:clrMapOvr>
-    <a:masterClrMapping/>
-  </p:clrMapOvr>
-</p:sld>
-</file>
-
-<file path=ppt/slides/slide8.xml><?xml version="1.0" encoding="utf-8"?>
-<p:sld xmlns:a="http://schemas.openxmlformats.org/drawingml/2006/main" xmlns:r="http://schemas.openxmlformats.org/officeDocument/2006/relationships" xmlns:p="http://schemas.openxmlformats.org/presentationml/2006/main">
-  <p:cSld>
-    <p:spTree>
-      <p:nvGrpSpPr>
-        <p:cNvPr id="1" name=""/>
-        <p:cNvGrpSpPr/>
-        <p:nvPr/>
-      </p:nvGrpSpPr>
-      <p:grpSpPr>
-        <a:xfrm>
-          <a:off x="0" y="0"/>
-          <a:ext cx="0" cy="0"/>
-          <a:chOff x="0" y="0"/>
-          <a:chExt cx="0" cy="0"/>
-        </a:xfrm>
-      </p:grpSpPr>
-      <p:sp>
-        <p:nvSpPr>
-          <p:cNvPr id="6" name="직사각형 5">
-            <a:extLst>
-              <a:ext uri="{FF2B5EF4-FFF2-40B4-BE49-F238E27FC236}">
-                <a16:creationId xmlns:a16="http://schemas.microsoft.com/office/drawing/2014/main" id="{5687AD07-703B-47CA-97EF-EB0084BCA8BC}"/>
-              </a:ext>
-            </a:extLst>
-          </p:cNvPr>
-          <p:cNvSpPr/>
-          <p:nvPr/>
-        </p:nvSpPr>
-        <p:spPr>
-          <a:xfrm>
-            <a:off x="5471178" y="3049802"/>
-            <a:ext cx="1606956" cy="720638"/>
-          </a:xfrm>
-          <a:prstGeom prst="rect">
-            <a:avLst/>
-          </a:prstGeom>
-          <a:noFill/>
-        </p:spPr>
-        <p:txBody>
-          <a:bodyPr lIns="0" anchor="ctr"/>
-          <a:lstStyle/>
-          <a:p>
-            <a:r>
-              <a:rPr lang="bg-BG" altLang="ko-KR" sz="4000" b="1" dirty="0">
-                <a:solidFill>
-                  <a:schemeClr val="bg1"/>
-                </a:solidFill>
-                <a:latin typeface="+mj-lt"/>
-              </a:rPr>
-              <a:t>Демо</a:t>
-            </a:r>
-            <a:endParaRPr lang="en-US" altLang="ko-KR" sz="4000" b="1" dirty="0">
-              <a:solidFill>
-                <a:schemeClr val="bg1"/>
-              </a:solidFill>
-              <a:latin typeface="+mj-lt"/>
-            </a:endParaRPr>
-          </a:p>
-        </p:txBody>
-      </p:sp>
-    </p:spTree>
-    <p:extLst>
-      <p:ext uri="{BB962C8B-B14F-4D97-AF65-F5344CB8AC3E}">
-        <p14:creationId xmlns:p14="http://schemas.microsoft.com/office/powerpoint/2010/main" val="1585171815"/>
-      </p:ext>
-    </p:extLst>
-  </p:cSld>
-  <p:clrMapOvr>
-    <a:masterClrMapping/>
-  </p:clrMapOvr>
-</p:sld>
-</file>
-
-<file path=ppt/slides/slide9.xml><?xml version="1.0" encoding="utf-8"?>
-<p:sld xmlns:a="http://schemas.openxmlformats.org/drawingml/2006/main" xmlns:r="http://schemas.openxmlformats.org/officeDocument/2006/relationships" xmlns:p="http://schemas.openxmlformats.org/presentationml/2006/main">
-  <p:cSld>
-    <p:spTree>
-      <p:nvGrpSpPr>
-        <p:cNvPr id="1" name=""/>
-        <p:cNvGrpSpPr/>
-        <p:nvPr/>
-      </p:nvGrpSpPr>
-      <p:grpSpPr>
-        <a:xfrm>
-          <a:off x="0" y="0"/>
-          <a:ext cx="0" cy="0"/>
-          <a:chOff x="0" y="0"/>
-          <a:chExt cx="0" cy="0"/>
-        </a:xfrm>
-      </p:grpSpPr>
-      <p:sp>
-        <p:nvSpPr>
-          <p:cNvPr id="4" name="TextBox 3">
-            <a:extLst>
-              <a:ext uri="{FF2B5EF4-FFF2-40B4-BE49-F238E27FC236}">
-                <a16:creationId xmlns:a16="http://schemas.microsoft.com/office/drawing/2014/main" id="{1DF8EF26-7AD5-4E7F-95B3-9A57CF80C483}"/>
-              </a:ext>
-            </a:extLst>
-          </p:cNvPr>
-          <p:cNvSpPr txBox="1"/>
-          <p:nvPr/>
-        </p:nvSpPr>
-        <p:spPr>
-          <a:xfrm>
-            <a:off x="1" y="4714489"/>
-            <a:ext cx="12191999" cy="1015663"/>
-          </a:xfrm>
-          <a:prstGeom prst="rect">
-            <a:avLst/>
-          </a:prstGeom>
-          <a:noFill/>
-        </p:spPr>
-        <p:txBody>
-          <a:bodyPr wrap="square" rtlCol="0" anchor="ctr">
-            <a:spAutoFit/>
-          </a:bodyPr>
-          <a:lstStyle/>
-          <a:p>
-            <a:pPr algn="ctr"/>
-            <a:r>
-              <a:rPr lang="bg-BG" altLang="ko-KR" sz="6000" dirty="0">
-                <a:cs typeface="Arial" pitchFamily="34" charset="0"/>
-              </a:rPr>
-              <a:t>Благодарим за вниманието!</a:t>
-            </a:r>
-            <a:endParaRPr lang="ko-KR" altLang="en-US" sz="6000" dirty="0">
-              <a:cs typeface="Arial" pitchFamily="34" charset="0"/>
-            </a:endParaRPr>
-          </a:p>
-        </p:txBody>
-      </p:sp>
-      <p:sp>
-        <p:nvSpPr>
-          <p:cNvPr id="5" name="TextBox 4">
-            <a:extLst>
-              <a:ext uri="{FF2B5EF4-FFF2-40B4-BE49-F238E27FC236}">
-                <a16:creationId xmlns:a16="http://schemas.microsoft.com/office/drawing/2014/main" id="{BADEB2CA-D11F-4CA5-BC5A-6C38FF4BF392}"/>
-              </a:ext>
-            </a:extLst>
-          </p:cNvPr>
-          <p:cNvSpPr txBox="1"/>
-          <p:nvPr/>
-        </p:nvSpPr>
-        <p:spPr>
-          <a:xfrm>
-            <a:off x="51" y="5653820"/>
-            <a:ext cx="12191852" cy="379656"/>
-          </a:xfrm>
-          <a:prstGeom prst="rect">
-            <a:avLst/>
-          </a:prstGeom>
-          <a:noFill/>
-        </p:spPr>
-        <p:txBody>
-          <a:bodyPr wrap="square" rtlCol="0" anchor="ctr">
-            <a:spAutoFit/>
-          </a:bodyPr>
-          <a:lstStyle/>
-          <a:p>
-            <a:pPr algn="ctr"/>
-            <a:r>
-              <a:rPr lang="bg-BG" altLang="ko-KR" sz="1867" dirty="0">
-                <a:cs typeface="Arial" pitchFamily="34" charset="0"/>
-              </a:rPr>
-              <a:t>Емил Коев и Павел Коев</a:t>
-            </a:r>
-            <a:endParaRPr lang="ko-KR" altLang="en-US" sz="1867" dirty="0">
-              <a:cs typeface="Arial" pitchFamily="34" charset="0"/>
-            </a:endParaRPr>
-          </a:p>
-        </p:txBody>
-      </p:sp>
-    </p:spTree>
-    <p:extLst>
-      <p:ext uri="{BB962C8B-B14F-4D97-AF65-F5344CB8AC3E}">
-        <p14:creationId xmlns:p14="http://schemas.microsoft.com/office/powerpoint/2010/main" val="821656516"/>
       </p:ext>
     </p:extLst>
   </p:cSld>

</xml_diff>